<commit_message>
Zoom/shrink/drag gameboard, more complete logging system
</commit_message>
<xml_diff>
--- a/Board_Display.pptx
+++ b/Board_Display.pptx
@@ -159,7 +159,7 @@
           </a:lstStyle>
           <a:p>
             <a:r>
-              <a:rPr lang="en-US" smtClean="0"/>
+              <a:rPr lang="en-US"/>
               <a:t>Click to edit Master title style</a:t>
             </a:r>
             <a:endParaRPr lang="en-US" dirty="0"/>
@@ -224,7 +224,7 @@
           </a:lstStyle>
           <a:p>
             <a:r>
-              <a:rPr lang="en-US" smtClean="0"/>
+              <a:rPr lang="en-US"/>
               <a:t>Click to edit Master subtitle style</a:t>
             </a:r>
             <a:endParaRPr lang="en-US" dirty="0"/>
@@ -248,7 +248,7 @@
           <a:p>
             <a:fld id="{09D1AB0D-6ABC-4A8F-A329-D321C82B9A5A}" type="datetimeFigureOut">
               <a:rPr lang="en-US" smtClean="0"/>
-              <a:t>5/20/2019</a:t>
+              <a:t>7/12/2019</a:t>
             </a:fld>
             <a:endParaRPr lang="en-US"/>
           </a:p>
@@ -342,7 +342,7 @@
           <a:lstStyle/>
           <a:p>
             <a:r>
-              <a:rPr lang="en-US" smtClean="0"/>
+              <a:rPr lang="en-US"/>
               <a:t>Click to edit Master title style</a:t>
             </a:r>
             <a:endParaRPr lang="en-US" dirty="0"/>
@@ -366,35 +366,35 @@
           <a:p>
             <a:pPr lvl="0"/>
             <a:r>
-              <a:rPr lang="en-US" smtClean="0"/>
+              <a:rPr lang="en-US"/>
               <a:t>Edit Master text styles</a:t>
             </a:r>
           </a:p>
           <a:p>
             <a:pPr lvl="1"/>
             <a:r>
-              <a:rPr lang="en-US" smtClean="0"/>
+              <a:rPr lang="en-US"/>
               <a:t>Second level</a:t>
             </a:r>
           </a:p>
           <a:p>
             <a:pPr lvl="2"/>
             <a:r>
-              <a:rPr lang="en-US" smtClean="0"/>
+              <a:rPr lang="en-US"/>
               <a:t>Third level</a:t>
             </a:r>
           </a:p>
           <a:p>
             <a:pPr lvl="3"/>
             <a:r>
-              <a:rPr lang="en-US" smtClean="0"/>
+              <a:rPr lang="en-US"/>
               <a:t>Fourth level</a:t>
             </a:r>
           </a:p>
           <a:p>
             <a:pPr lvl="4"/>
             <a:r>
-              <a:rPr lang="en-US" smtClean="0"/>
+              <a:rPr lang="en-US"/>
               <a:t>Fifth level</a:t>
             </a:r>
             <a:endParaRPr lang="en-US" dirty="0"/>
@@ -418,7 +418,7 @@
           <a:p>
             <a:fld id="{09D1AB0D-6ABC-4A8F-A329-D321C82B9A5A}" type="datetimeFigureOut">
               <a:rPr lang="en-US" smtClean="0"/>
-              <a:t>5/20/2019</a:t>
+              <a:t>7/12/2019</a:t>
             </a:fld>
             <a:endParaRPr lang="en-US"/>
           </a:p>
@@ -517,7 +517,7 @@
           <a:lstStyle/>
           <a:p>
             <a:r>
-              <a:rPr lang="en-US" smtClean="0"/>
+              <a:rPr lang="en-US"/>
               <a:t>Click to edit Master title style</a:t>
             </a:r>
             <a:endParaRPr lang="en-US" dirty="0"/>
@@ -546,35 +546,35 @@
           <a:p>
             <a:pPr lvl="0"/>
             <a:r>
-              <a:rPr lang="en-US" smtClean="0"/>
+              <a:rPr lang="en-US"/>
               <a:t>Edit Master text styles</a:t>
             </a:r>
           </a:p>
           <a:p>
             <a:pPr lvl="1"/>
             <a:r>
-              <a:rPr lang="en-US" smtClean="0"/>
+              <a:rPr lang="en-US"/>
               <a:t>Second level</a:t>
             </a:r>
           </a:p>
           <a:p>
             <a:pPr lvl="2"/>
             <a:r>
-              <a:rPr lang="en-US" smtClean="0"/>
+              <a:rPr lang="en-US"/>
               <a:t>Third level</a:t>
             </a:r>
           </a:p>
           <a:p>
             <a:pPr lvl="3"/>
             <a:r>
-              <a:rPr lang="en-US" smtClean="0"/>
+              <a:rPr lang="en-US"/>
               <a:t>Fourth level</a:t>
             </a:r>
           </a:p>
           <a:p>
             <a:pPr lvl="4"/>
             <a:r>
-              <a:rPr lang="en-US" smtClean="0"/>
+              <a:rPr lang="en-US"/>
               <a:t>Fifth level</a:t>
             </a:r>
             <a:endParaRPr lang="en-US" dirty="0"/>
@@ -598,7 +598,7 @@
           <a:p>
             <a:fld id="{09D1AB0D-6ABC-4A8F-A329-D321C82B9A5A}" type="datetimeFigureOut">
               <a:rPr lang="en-US" smtClean="0"/>
-              <a:t>5/20/2019</a:t>
+              <a:t>7/12/2019</a:t>
             </a:fld>
             <a:endParaRPr lang="en-US"/>
           </a:p>
@@ -692,7 +692,7 @@
           <a:lstStyle/>
           <a:p>
             <a:r>
-              <a:rPr lang="en-US" smtClean="0"/>
+              <a:rPr lang="en-US"/>
               <a:t>Click to edit Master title style</a:t>
             </a:r>
             <a:endParaRPr lang="en-US" dirty="0"/>
@@ -716,35 +716,35 @@
           <a:p>
             <a:pPr lvl="0"/>
             <a:r>
-              <a:rPr lang="en-US" smtClean="0"/>
+              <a:rPr lang="en-US"/>
               <a:t>Edit Master text styles</a:t>
             </a:r>
           </a:p>
           <a:p>
             <a:pPr lvl="1"/>
             <a:r>
-              <a:rPr lang="en-US" smtClean="0"/>
+              <a:rPr lang="en-US"/>
               <a:t>Second level</a:t>
             </a:r>
           </a:p>
           <a:p>
             <a:pPr lvl="2"/>
             <a:r>
-              <a:rPr lang="en-US" smtClean="0"/>
+              <a:rPr lang="en-US"/>
               <a:t>Third level</a:t>
             </a:r>
           </a:p>
           <a:p>
             <a:pPr lvl="3"/>
             <a:r>
-              <a:rPr lang="en-US" smtClean="0"/>
+              <a:rPr lang="en-US"/>
               <a:t>Fourth level</a:t>
             </a:r>
           </a:p>
           <a:p>
             <a:pPr lvl="4"/>
             <a:r>
-              <a:rPr lang="en-US" smtClean="0"/>
+              <a:rPr lang="en-US"/>
               <a:t>Fifth level</a:t>
             </a:r>
             <a:endParaRPr lang="en-US" dirty="0"/>
@@ -768,7 +768,7 @@
           <a:p>
             <a:fld id="{09D1AB0D-6ABC-4A8F-A329-D321C82B9A5A}" type="datetimeFigureOut">
               <a:rPr lang="en-US" smtClean="0"/>
-              <a:t>5/20/2019</a:t>
+              <a:t>7/12/2019</a:t>
             </a:fld>
             <a:endParaRPr lang="en-US"/>
           </a:p>
@@ -871,7 +871,7 @@
           </a:lstStyle>
           <a:p>
             <a:r>
-              <a:rPr lang="en-US" smtClean="0"/>
+              <a:rPr lang="en-US"/>
               <a:t>Click to edit Master title style</a:t>
             </a:r>
             <a:endParaRPr lang="en-US" dirty="0"/>
@@ -991,7 +991,7 @@
           <a:p>
             <a:pPr lvl="0"/>
             <a:r>
-              <a:rPr lang="en-US" smtClean="0"/>
+              <a:rPr lang="en-US"/>
               <a:t>Edit Master text styles</a:t>
             </a:r>
           </a:p>
@@ -1014,7 +1014,7 @@
           <a:p>
             <a:fld id="{09D1AB0D-6ABC-4A8F-A329-D321C82B9A5A}" type="datetimeFigureOut">
               <a:rPr lang="en-US" smtClean="0"/>
-              <a:t>5/20/2019</a:t>
+              <a:t>7/12/2019</a:t>
             </a:fld>
             <a:endParaRPr lang="en-US"/>
           </a:p>
@@ -1108,7 +1108,7 @@
           <a:lstStyle/>
           <a:p>
             <a:r>
-              <a:rPr lang="en-US" smtClean="0"/>
+              <a:rPr lang="en-US"/>
               <a:t>Click to edit Master title style</a:t>
             </a:r>
             <a:endParaRPr lang="en-US" dirty="0"/>
@@ -1137,35 +1137,35 @@
           <a:p>
             <a:pPr lvl="0"/>
             <a:r>
-              <a:rPr lang="en-US" smtClean="0"/>
+              <a:rPr lang="en-US"/>
               <a:t>Edit Master text styles</a:t>
             </a:r>
           </a:p>
           <a:p>
             <a:pPr lvl="1"/>
             <a:r>
-              <a:rPr lang="en-US" smtClean="0"/>
+              <a:rPr lang="en-US"/>
               <a:t>Second level</a:t>
             </a:r>
           </a:p>
           <a:p>
             <a:pPr lvl="2"/>
             <a:r>
-              <a:rPr lang="en-US" smtClean="0"/>
+              <a:rPr lang="en-US"/>
               <a:t>Third level</a:t>
             </a:r>
           </a:p>
           <a:p>
             <a:pPr lvl="3"/>
             <a:r>
-              <a:rPr lang="en-US" smtClean="0"/>
+              <a:rPr lang="en-US"/>
               <a:t>Fourth level</a:t>
             </a:r>
           </a:p>
           <a:p>
             <a:pPr lvl="4"/>
             <a:r>
-              <a:rPr lang="en-US" smtClean="0"/>
+              <a:rPr lang="en-US"/>
               <a:t>Fifth level</a:t>
             </a:r>
             <a:endParaRPr lang="en-US" dirty="0"/>
@@ -1194,35 +1194,35 @@
           <a:p>
             <a:pPr lvl="0"/>
             <a:r>
-              <a:rPr lang="en-US" smtClean="0"/>
+              <a:rPr lang="en-US"/>
               <a:t>Edit Master text styles</a:t>
             </a:r>
           </a:p>
           <a:p>
             <a:pPr lvl="1"/>
             <a:r>
-              <a:rPr lang="en-US" smtClean="0"/>
+              <a:rPr lang="en-US"/>
               <a:t>Second level</a:t>
             </a:r>
           </a:p>
           <a:p>
             <a:pPr lvl="2"/>
             <a:r>
-              <a:rPr lang="en-US" smtClean="0"/>
+              <a:rPr lang="en-US"/>
               <a:t>Third level</a:t>
             </a:r>
           </a:p>
           <a:p>
             <a:pPr lvl="3"/>
             <a:r>
-              <a:rPr lang="en-US" smtClean="0"/>
+              <a:rPr lang="en-US"/>
               <a:t>Fourth level</a:t>
             </a:r>
           </a:p>
           <a:p>
             <a:pPr lvl="4"/>
             <a:r>
-              <a:rPr lang="en-US" smtClean="0"/>
+              <a:rPr lang="en-US"/>
               <a:t>Fifth level</a:t>
             </a:r>
             <a:endParaRPr lang="en-US" dirty="0"/>
@@ -1246,7 +1246,7 @@
           <a:p>
             <a:fld id="{09D1AB0D-6ABC-4A8F-A329-D321C82B9A5A}" type="datetimeFigureOut">
               <a:rPr lang="en-US" smtClean="0"/>
-              <a:t>5/20/2019</a:t>
+              <a:t>7/12/2019</a:t>
             </a:fld>
             <a:endParaRPr lang="en-US"/>
           </a:p>
@@ -1345,7 +1345,7 @@
           <a:lstStyle/>
           <a:p>
             <a:r>
-              <a:rPr lang="en-US" smtClean="0"/>
+              <a:rPr lang="en-US"/>
               <a:t>Click to edit Master title style</a:t>
             </a:r>
             <a:endParaRPr lang="en-US" dirty="0"/>
@@ -1411,7 +1411,7 @@
           <a:p>
             <a:pPr lvl="0"/>
             <a:r>
-              <a:rPr lang="en-US" smtClean="0"/>
+              <a:rPr lang="en-US"/>
               <a:t>Edit Master text styles</a:t>
             </a:r>
           </a:p>
@@ -1439,35 +1439,35 @@
           <a:p>
             <a:pPr lvl="0"/>
             <a:r>
-              <a:rPr lang="en-US" smtClean="0"/>
+              <a:rPr lang="en-US"/>
               <a:t>Edit Master text styles</a:t>
             </a:r>
           </a:p>
           <a:p>
             <a:pPr lvl="1"/>
             <a:r>
-              <a:rPr lang="en-US" smtClean="0"/>
+              <a:rPr lang="en-US"/>
               <a:t>Second level</a:t>
             </a:r>
           </a:p>
           <a:p>
             <a:pPr lvl="2"/>
             <a:r>
-              <a:rPr lang="en-US" smtClean="0"/>
+              <a:rPr lang="en-US"/>
               <a:t>Third level</a:t>
             </a:r>
           </a:p>
           <a:p>
             <a:pPr lvl="3"/>
             <a:r>
-              <a:rPr lang="en-US" smtClean="0"/>
+              <a:rPr lang="en-US"/>
               <a:t>Fourth level</a:t>
             </a:r>
           </a:p>
           <a:p>
             <a:pPr lvl="4"/>
             <a:r>
-              <a:rPr lang="en-US" smtClean="0"/>
+              <a:rPr lang="en-US"/>
               <a:t>Fifth level</a:t>
             </a:r>
             <a:endParaRPr lang="en-US" dirty="0"/>
@@ -1533,7 +1533,7 @@
           <a:p>
             <a:pPr lvl="0"/>
             <a:r>
-              <a:rPr lang="en-US" smtClean="0"/>
+              <a:rPr lang="en-US"/>
               <a:t>Edit Master text styles</a:t>
             </a:r>
           </a:p>
@@ -1561,35 +1561,35 @@
           <a:p>
             <a:pPr lvl="0"/>
             <a:r>
-              <a:rPr lang="en-US" smtClean="0"/>
+              <a:rPr lang="en-US"/>
               <a:t>Edit Master text styles</a:t>
             </a:r>
           </a:p>
           <a:p>
             <a:pPr lvl="1"/>
             <a:r>
-              <a:rPr lang="en-US" smtClean="0"/>
+              <a:rPr lang="en-US"/>
               <a:t>Second level</a:t>
             </a:r>
           </a:p>
           <a:p>
             <a:pPr lvl="2"/>
             <a:r>
-              <a:rPr lang="en-US" smtClean="0"/>
+              <a:rPr lang="en-US"/>
               <a:t>Third level</a:t>
             </a:r>
           </a:p>
           <a:p>
             <a:pPr lvl="3"/>
             <a:r>
-              <a:rPr lang="en-US" smtClean="0"/>
+              <a:rPr lang="en-US"/>
               <a:t>Fourth level</a:t>
             </a:r>
           </a:p>
           <a:p>
             <a:pPr lvl="4"/>
             <a:r>
-              <a:rPr lang="en-US" smtClean="0"/>
+              <a:rPr lang="en-US"/>
               <a:t>Fifth level</a:t>
             </a:r>
             <a:endParaRPr lang="en-US" dirty="0"/>
@@ -1613,7 +1613,7 @@
           <a:p>
             <a:fld id="{09D1AB0D-6ABC-4A8F-A329-D321C82B9A5A}" type="datetimeFigureOut">
               <a:rPr lang="en-US" smtClean="0"/>
-              <a:t>5/20/2019</a:t>
+              <a:t>7/12/2019</a:t>
             </a:fld>
             <a:endParaRPr lang="en-US"/>
           </a:p>
@@ -1707,7 +1707,7 @@
           <a:lstStyle/>
           <a:p>
             <a:r>
-              <a:rPr lang="en-US" smtClean="0"/>
+              <a:rPr lang="en-US"/>
               <a:t>Click to edit Master title style</a:t>
             </a:r>
             <a:endParaRPr lang="en-US" dirty="0"/>
@@ -1731,7 +1731,7 @@
           <a:p>
             <a:fld id="{09D1AB0D-6ABC-4A8F-A329-D321C82B9A5A}" type="datetimeFigureOut">
               <a:rPr lang="en-US" smtClean="0"/>
-              <a:t>5/20/2019</a:t>
+              <a:t>7/12/2019</a:t>
             </a:fld>
             <a:endParaRPr lang="en-US"/>
           </a:p>
@@ -1826,7 +1826,7 @@
           <a:p>
             <a:fld id="{09D1AB0D-6ABC-4A8F-A329-D321C82B9A5A}" type="datetimeFigureOut">
               <a:rPr lang="en-US" smtClean="0"/>
-              <a:t>5/20/2019</a:t>
+              <a:t>7/12/2019</a:t>
             </a:fld>
             <a:endParaRPr lang="en-US"/>
           </a:p>
@@ -1929,7 +1929,7 @@
           </a:lstStyle>
           <a:p>
             <a:r>
-              <a:rPr lang="en-US" smtClean="0"/>
+              <a:rPr lang="en-US"/>
               <a:t>Click to edit Master title style</a:t>
             </a:r>
             <a:endParaRPr lang="en-US" dirty="0"/>
@@ -1986,35 +1986,35 @@
           <a:p>
             <a:pPr lvl="0"/>
             <a:r>
-              <a:rPr lang="en-US" smtClean="0"/>
+              <a:rPr lang="en-US"/>
               <a:t>Edit Master text styles</a:t>
             </a:r>
           </a:p>
           <a:p>
             <a:pPr lvl="1"/>
             <a:r>
-              <a:rPr lang="en-US" smtClean="0"/>
+              <a:rPr lang="en-US"/>
               <a:t>Second level</a:t>
             </a:r>
           </a:p>
           <a:p>
             <a:pPr lvl="2"/>
             <a:r>
-              <a:rPr lang="en-US" smtClean="0"/>
+              <a:rPr lang="en-US"/>
               <a:t>Third level</a:t>
             </a:r>
           </a:p>
           <a:p>
             <a:pPr lvl="3"/>
             <a:r>
-              <a:rPr lang="en-US" smtClean="0"/>
+              <a:rPr lang="en-US"/>
               <a:t>Fourth level</a:t>
             </a:r>
           </a:p>
           <a:p>
             <a:pPr lvl="4"/>
             <a:r>
-              <a:rPr lang="en-US" smtClean="0"/>
+              <a:rPr lang="en-US"/>
               <a:t>Fifth level</a:t>
             </a:r>
             <a:endParaRPr lang="en-US" dirty="0"/>
@@ -2080,7 +2080,7 @@
           <a:p>
             <a:pPr lvl="0"/>
             <a:r>
-              <a:rPr lang="en-US" smtClean="0"/>
+              <a:rPr lang="en-US"/>
               <a:t>Edit Master text styles</a:t>
             </a:r>
           </a:p>
@@ -2103,7 +2103,7 @@
           <a:p>
             <a:fld id="{09D1AB0D-6ABC-4A8F-A329-D321C82B9A5A}" type="datetimeFigureOut">
               <a:rPr lang="en-US" smtClean="0"/>
-              <a:t>5/20/2019</a:t>
+              <a:t>7/12/2019</a:t>
             </a:fld>
             <a:endParaRPr lang="en-US"/>
           </a:p>
@@ -2206,7 +2206,7 @@
           </a:lstStyle>
           <a:p>
             <a:r>
-              <a:rPr lang="en-US" smtClean="0"/>
+              <a:rPr lang="en-US"/>
               <a:t>Click to edit Master title style</a:t>
             </a:r>
             <a:endParaRPr lang="en-US" dirty="0"/>
@@ -2271,7 +2271,7 @@
           </a:lstStyle>
           <a:p>
             <a:r>
-              <a:rPr lang="en-US" smtClean="0"/>
+              <a:rPr lang="en-US"/>
               <a:t>Click icon to add picture</a:t>
             </a:r>
             <a:endParaRPr lang="en-US" dirty="0"/>
@@ -2337,7 +2337,7 @@
           <a:p>
             <a:pPr lvl="0"/>
             <a:r>
-              <a:rPr lang="en-US" smtClean="0"/>
+              <a:rPr lang="en-US"/>
               <a:t>Edit Master text styles</a:t>
             </a:r>
           </a:p>
@@ -2360,7 +2360,7 @@
           <a:p>
             <a:fld id="{09D1AB0D-6ABC-4A8F-A329-D321C82B9A5A}" type="datetimeFigureOut">
               <a:rPr lang="en-US" smtClean="0"/>
-              <a:t>5/20/2019</a:t>
+              <a:t>7/12/2019</a:t>
             </a:fld>
             <a:endParaRPr lang="en-US"/>
           </a:p>
@@ -2469,7 +2469,7 @@
           <a:lstStyle/>
           <a:p>
             <a:r>
-              <a:rPr lang="en-US" smtClean="0"/>
+              <a:rPr lang="en-US"/>
               <a:t>Click to edit Master title style</a:t>
             </a:r>
             <a:endParaRPr lang="en-US" dirty="0"/>
@@ -2503,35 +2503,35 @@
           <a:p>
             <a:pPr lvl="0"/>
             <a:r>
-              <a:rPr lang="en-US" smtClean="0"/>
+              <a:rPr lang="en-US"/>
               <a:t>Edit Master text styles</a:t>
             </a:r>
           </a:p>
           <a:p>
             <a:pPr lvl="1"/>
             <a:r>
-              <a:rPr lang="en-US" smtClean="0"/>
+              <a:rPr lang="en-US"/>
               <a:t>Second level</a:t>
             </a:r>
           </a:p>
           <a:p>
             <a:pPr lvl="2"/>
             <a:r>
-              <a:rPr lang="en-US" smtClean="0"/>
+              <a:rPr lang="en-US"/>
               <a:t>Third level</a:t>
             </a:r>
           </a:p>
           <a:p>
             <a:pPr lvl="3"/>
             <a:r>
-              <a:rPr lang="en-US" smtClean="0"/>
+              <a:rPr lang="en-US"/>
               <a:t>Fourth level</a:t>
             </a:r>
           </a:p>
           <a:p>
             <a:pPr lvl="4"/>
             <a:r>
-              <a:rPr lang="en-US" smtClean="0"/>
+              <a:rPr lang="en-US"/>
               <a:t>Fifth level</a:t>
             </a:r>
             <a:endParaRPr lang="en-US" dirty="0"/>
@@ -2573,7 +2573,7 @@
           <a:p>
             <a:fld id="{09D1AB0D-6ABC-4A8F-A329-D321C82B9A5A}" type="datetimeFigureOut">
               <a:rPr lang="en-US" smtClean="0"/>
-              <a:t>5/20/2019</a:t>
+              <a:t>7/12/2019</a:t>
             </a:fld>
             <a:endParaRPr lang="en-US"/>
           </a:p>
@@ -3072,7 +3072,7 @@
           <a:p>
             <a:pPr algn="ctr"/>
             <a:r>
-              <a:rPr lang="zh-CN" altLang="en-US" sz="8000" spc="1000" dirty="0" smtClean="0">
+              <a:rPr lang="zh-CN" altLang="en-US" sz="8000" spc="1000" dirty="0">
                 <a:latin typeface="Microsoft YaHei" panose="020B0503020204020204" pitchFamily="34" charset="-122"/>
                 <a:ea typeface="Microsoft YaHei" panose="020B0503020204020204" pitchFamily="34" charset="-122"/>
               </a:rPr>
@@ -3434,7 +3434,7 @@
           <a:p>
             <a:pPr algn="ctr"/>
             <a:r>
-              <a:rPr lang="zh-CN" altLang="en-US" dirty="0" smtClean="0">
+              <a:rPr lang="zh-CN" altLang="en-US" dirty="0">
                 <a:latin typeface="Microsoft YaHei" panose="020B0503020204020204" pitchFamily="34" charset="-122"/>
                 <a:ea typeface="Microsoft YaHei" panose="020B0503020204020204" pitchFamily="34" charset="-122"/>
               </a:rPr>
@@ -3508,7 +3508,7 @@
           <a:p>
             <a:pPr algn="ctr"/>
             <a:r>
-              <a:rPr lang="zh-CN" altLang="en-US" dirty="0" smtClean="0">
+              <a:rPr lang="zh-CN" altLang="en-US" dirty="0">
                 <a:latin typeface="Microsoft YaHei" panose="020B0503020204020204" pitchFamily="34" charset="-122"/>
                 <a:ea typeface="Microsoft YaHei" panose="020B0503020204020204" pitchFamily="34" charset="-122"/>
               </a:rPr>
@@ -3531,13 +3531,6 @@
   <p:clrMapOvr>
     <a:masterClrMapping/>
   </p:clrMapOvr>
-  <p:timing>
-    <p:tnLst>
-      <p:par>
-        <p:cTn id="1" dur="indefinite" restart="never" nodeType="tmRoot"/>
-      </p:par>
-    </p:tnLst>
-  </p:timing>
 </p:sld>
 </file>
 
@@ -3976,7 +3969,7 @@
           <a:lstStyle/>
           <a:p>
             <a:r>
-              <a:rPr lang="zh-CN" altLang="en-US" sz="4000" dirty="0" smtClean="0">
+              <a:rPr lang="zh-CN" altLang="en-US" sz="4000" dirty="0">
                 <a:effectLst>
                   <a:outerShdw blurRad="88900" dist="63500" dir="2400000" algn="ctr" rotWithShape="0">
                     <a:schemeClr val="bg1">
@@ -4033,7 +4026,7 @@
               <a:t>房间</a:t>
             </a:r>
             <a:r>
-              <a:rPr lang="en-US" altLang="zh-CN" sz="2800" dirty="0" smtClean="0">
+              <a:rPr lang="en-US" altLang="zh-CN" sz="2800" dirty="0">
                 <a:latin typeface="Microsoft YaHei Light" panose="020B0502040204020203" pitchFamily="34" charset="-122"/>
                 <a:ea typeface="Microsoft YaHei Light" panose="020B0502040204020203" pitchFamily="34" charset="-122"/>
               </a:rPr>
@@ -4070,21 +4063,21 @@
           <a:p>
             <a:pPr algn="r"/>
             <a:r>
-              <a:rPr lang="en-US" altLang="zh-CN" sz="2800" dirty="0" smtClean="0">
+              <a:rPr lang="en-US" altLang="zh-CN" sz="2800" dirty="0">
                 <a:latin typeface="Microsoft YaHei Light" panose="020B0502040204020203" pitchFamily="34" charset="-122"/>
                 <a:ea typeface="Microsoft YaHei Light" panose="020B0502040204020203" pitchFamily="34" charset="-122"/>
               </a:rPr>
               <a:t>[</a:t>
             </a:r>
             <a:r>
-              <a:rPr lang="zh-CN" altLang="en-US" sz="2800" dirty="0" smtClean="0">
+              <a:rPr lang="zh-CN" altLang="en-US" sz="2800" dirty="0">
                 <a:latin typeface="Microsoft YaHei Light" panose="020B0502040204020203" pitchFamily="34" charset="-122"/>
                 <a:ea typeface="Microsoft YaHei Light" panose="020B0502040204020203" pitchFamily="34" charset="-122"/>
               </a:rPr>
               <a:t>空闲</a:t>
             </a:r>
             <a:r>
-              <a:rPr lang="en-US" altLang="zh-CN" sz="2800" dirty="0" smtClean="0">
+              <a:rPr lang="en-US" altLang="zh-CN" sz="2800" dirty="0">
                 <a:latin typeface="Microsoft YaHei Light" panose="020B0502040204020203" pitchFamily="34" charset="-122"/>
                 <a:ea typeface="Microsoft YaHei Light" panose="020B0502040204020203" pitchFamily="34" charset="-122"/>
               </a:rPr>
@@ -4166,14 +4159,7 @@
                 <a:latin typeface="Microsoft YaHei Light" panose="020B0502040204020203" pitchFamily="34" charset="-122"/>
                 <a:ea typeface="Microsoft YaHei Light" panose="020B0502040204020203" pitchFamily="34" charset="-122"/>
               </a:rPr>
-              <a:t>房</a:t>
-            </a:r>
-            <a:r>
-              <a:rPr lang="zh-CN" altLang="en-US" sz="2800" dirty="0" smtClean="0">
-                <a:latin typeface="Microsoft YaHei Light" panose="020B0502040204020203" pitchFamily="34" charset="-122"/>
-                <a:ea typeface="Microsoft YaHei Light" panose="020B0502040204020203" pitchFamily="34" charset="-122"/>
-              </a:rPr>
-              <a:t>间</a:t>
+              <a:t>房间</a:t>
             </a:r>
             <a:r>
               <a:rPr lang="en-US" altLang="zh-CN" sz="2800" dirty="0">
@@ -4213,21 +4199,21 @@
           <a:p>
             <a:pPr algn="r"/>
             <a:r>
-              <a:rPr lang="en-US" altLang="zh-CN" sz="2800" dirty="0" smtClean="0">
+              <a:rPr lang="en-US" altLang="zh-CN" sz="2800" dirty="0">
                 <a:latin typeface="Microsoft YaHei Light" panose="020B0502040204020203" pitchFamily="34" charset="-122"/>
                 <a:ea typeface="Microsoft YaHei Light" panose="020B0502040204020203" pitchFamily="34" charset="-122"/>
               </a:rPr>
               <a:t>[</a:t>
             </a:r>
             <a:r>
-              <a:rPr lang="zh-CN" altLang="en-US" sz="2800" dirty="0" smtClean="0">
+              <a:rPr lang="zh-CN" altLang="en-US" sz="2800" dirty="0">
                 <a:latin typeface="Microsoft YaHei Light" panose="020B0502040204020203" pitchFamily="34" charset="-122"/>
                 <a:ea typeface="Microsoft YaHei Light" panose="020B0502040204020203" pitchFamily="34" charset="-122"/>
               </a:rPr>
               <a:t>游戏中</a:t>
             </a:r>
             <a:r>
-              <a:rPr lang="en-US" altLang="zh-CN" sz="2800" dirty="0" smtClean="0">
+              <a:rPr lang="en-US" altLang="zh-CN" sz="2800" dirty="0">
                 <a:latin typeface="Microsoft YaHei Light" panose="020B0502040204020203" pitchFamily="34" charset="-122"/>
                 <a:ea typeface="Microsoft YaHei Light" panose="020B0502040204020203" pitchFamily="34" charset="-122"/>
               </a:rPr>
@@ -4267,17 +4253,10 @@
                 <a:latin typeface="Microsoft YaHei Light" panose="020B0502040204020203" pitchFamily="34" charset="-122"/>
                 <a:ea typeface="Microsoft YaHei Light" panose="020B0502040204020203" pitchFamily="34" charset="-122"/>
               </a:rPr>
-              <a:t>房</a:t>
-            </a:r>
-            <a:r>
-              <a:rPr lang="zh-CN" altLang="en-US" sz="2800" dirty="0" smtClean="0">
-                <a:latin typeface="Microsoft YaHei Light" panose="020B0502040204020203" pitchFamily="34" charset="-122"/>
-                <a:ea typeface="Microsoft YaHei Light" panose="020B0502040204020203" pitchFamily="34" charset="-122"/>
-              </a:rPr>
-              <a:t>间</a:t>
-            </a:r>
-            <a:r>
-              <a:rPr lang="en-US" altLang="zh-CN" sz="2800" dirty="0" smtClean="0">
+              <a:t>房间</a:t>
+            </a:r>
+            <a:r>
+              <a:rPr lang="en-US" altLang="zh-CN" sz="2800" dirty="0">
                 <a:latin typeface="Microsoft YaHei Light" panose="020B0502040204020203" pitchFamily="34" charset="-122"/>
                 <a:ea typeface="Microsoft YaHei Light" panose="020B0502040204020203" pitchFamily="34" charset="-122"/>
               </a:rPr>
@@ -4314,7 +4293,7 @@
           <a:p>
             <a:pPr algn="r"/>
             <a:r>
-              <a:rPr lang="en-US" altLang="zh-CN" sz="2800" dirty="0" smtClean="0">
+              <a:rPr lang="en-US" altLang="zh-CN" sz="2800" dirty="0">
                 <a:latin typeface="Microsoft YaHei Light" panose="020B0502040204020203" pitchFamily="34" charset="-122"/>
                 <a:ea typeface="Microsoft YaHei Light" panose="020B0502040204020203" pitchFamily="34" charset="-122"/>
               </a:rPr>
@@ -4325,17 +4304,10 @@
                 <a:latin typeface="Microsoft YaHei Light" panose="020B0502040204020203" pitchFamily="34" charset="-122"/>
                 <a:ea typeface="Microsoft YaHei Light" panose="020B0502040204020203" pitchFamily="34" charset="-122"/>
               </a:rPr>
-              <a:t>空</a:t>
-            </a:r>
-            <a:r>
-              <a:rPr lang="zh-CN" altLang="en-US" sz="2800" dirty="0" smtClean="0">
-                <a:latin typeface="Microsoft YaHei Light" panose="020B0502040204020203" pitchFamily="34" charset="-122"/>
-                <a:ea typeface="Microsoft YaHei Light" panose="020B0502040204020203" pitchFamily="34" charset="-122"/>
-              </a:rPr>
-              <a:t>闲</a:t>
-            </a:r>
-            <a:r>
-              <a:rPr lang="en-US" altLang="zh-CN" sz="2800" dirty="0" smtClean="0">
+              <a:t>空闲</a:t>
+            </a:r>
+            <a:r>
+              <a:rPr lang="en-US" altLang="zh-CN" sz="2800" dirty="0">
                 <a:latin typeface="Microsoft YaHei Light" panose="020B0502040204020203" pitchFamily="34" charset="-122"/>
                 <a:ea typeface="Microsoft YaHei Light" panose="020B0502040204020203" pitchFamily="34" charset="-122"/>
               </a:rPr>
@@ -4375,17 +4347,10 @@
                 <a:latin typeface="Microsoft YaHei Light" panose="020B0502040204020203" pitchFamily="34" charset="-122"/>
                 <a:ea typeface="Microsoft YaHei Light" panose="020B0502040204020203" pitchFamily="34" charset="-122"/>
               </a:rPr>
-              <a:t>房</a:t>
-            </a:r>
-            <a:r>
-              <a:rPr lang="zh-CN" altLang="en-US" sz="2800" dirty="0" smtClean="0">
-                <a:latin typeface="Microsoft YaHei Light" panose="020B0502040204020203" pitchFamily="34" charset="-122"/>
-                <a:ea typeface="Microsoft YaHei Light" panose="020B0502040204020203" pitchFamily="34" charset="-122"/>
-              </a:rPr>
-              <a:t>间</a:t>
-            </a:r>
-            <a:r>
-              <a:rPr lang="en-US" altLang="zh-CN" sz="2800" dirty="0" smtClean="0">
+              <a:t>房间</a:t>
+            </a:r>
+            <a:r>
+              <a:rPr lang="en-US" altLang="zh-CN" sz="2800" dirty="0">
                 <a:latin typeface="Microsoft YaHei Light" panose="020B0502040204020203" pitchFamily="34" charset="-122"/>
                 <a:ea typeface="Microsoft YaHei Light" panose="020B0502040204020203" pitchFamily="34" charset="-122"/>
               </a:rPr>
@@ -4422,21 +4387,21 @@
           <a:p>
             <a:pPr algn="r"/>
             <a:r>
-              <a:rPr lang="en-US" altLang="zh-CN" sz="2800" dirty="0" smtClean="0">
+              <a:rPr lang="en-US" altLang="zh-CN" sz="2800" dirty="0">
                 <a:latin typeface="Microsoft YaHei Light" panose="020B0502040204020203" pitchFamily="34" charset="-122"/>
                 <a:ea typeface="Microsoft YaHei Light" panose="020B0502040204020203" pitchFamily="34" charset="-122"/>
               </a:rPr>
               <a:t>[</a:t>
             </a:r>
             <a:r>
-              <a:rPr lang="zh-CN" altLang="en-US" sz="2800" dirty="0" smtClean="0">
+              <a:rPr lang="zh-CN" altLang="en-US" sz="2800" dirty="0">
                 <a:latin typeface="Microsoft YaHei Light" panose="020B0502040204020203" pitchFamily="34" charset="-122"/>
                 <a:ea typeface="Microsoft YaHei Light" panose="020B0502040204020203" pitchFamily="34" charset="-122"/>
               </a:rPr>
               <a:t>游戏中</a:t>
             </a:r>
             <a:r>
-              <a:rPr lang="en-US" altLang="zh-CN" sz="2800" dirty="0" smtClean="0">
+              <a:rPr lang="en-US" altLang="zh-CN" sz="2800" dirty="0">
                 <a:latin typeface="Microsoft YaHei Light" panose="020B0502040204020203" pitchFamily="34" charset="-122"/>
                 <a:ea typeface="Microsoft YaHei Light" panose="020B0502040204020203" pitchFamily="34" charset="-122"/>
               </a:rPr>
@@ -4476,17 +4441,10 @@
                 <a:latin typeface="Microsoft YaHei Light" panose="020B0502040204020203" pitchFamily="34" charset="-122"/>
                 <a:ea typeface="Microsoft YaHei Light" panose="020B0502040204020203" pitchFamily="34" charset="-122"/>
               </a:rPr>
-              <a:t>房</a:t>
-            </a:r>
-            <a:r>
-              <a:rPr lang="zh-CN" altLang="en-US" sz="2800" dirty="0" smtClean="0">
-                <a:latin typeface="Microsoft YaHei Light" panose="020B0502040204020203" pitchFamily="34" charset="-122"/>
-                <a:ea typeface="Microsoft YaHei Light" panose="020B0502040204020203" pitchFamily="34" charset="-122"/>
-              </a:rPr>
-              <a:t>间</a:t>
-            </a:r>
-            <a:r>
-              <a:rPr lang="en-US" altLang="zh-CN" sz="2800" dirty="0" smtClean="0">
+              <a:t>房间</a:t>
+            </a:r>
+            <a:r>
+              <a:rPr lang="en-US" altLang="zh-CN" sz="2800" dirty="0">
                 <a:latin typeface="Microsoft YaHei Light" panose="020B0502040204020203" pitchFamily="34" charset="-122"/>
                 <a:ea typeface="Microsoft YaHei Light" panose="020B0502040204020203" pitchFamily="34" charset="-122"/>
               </a:rPr>
@@ -4519,21 +4477,21 @@
           <a:p>
             <a:pPr algn="r"/>
             <a:r>
-              <a:rPr lang="en-US" altLang="zh-CN" sz="2800" dirty="0" smtClean="0">
+              <a:rPr lang="en-US" altLang="zh-CN" sz="2800" dirty="0">
                 <a:latin typeface="Microsoft YaHei Light" panose="020B0502040204020203" pitchFamily="34" charset="-122"/>
                 <a:ea typeface="Microsoft YaHei Light" panose="020B0502040204020203" pitchFamily="34" charset="-122"/>
               </a:rPr>
               <a:t>[</a:t>
             </a:r>
             <a:r>
-              <a:rPr lang="zh-CN" altLang="en-US" sz="2800" dirty="0" smtClean="0">
+              <a:rPr lang="zh-CN" altLang="en-US" sz="2800" dirty="0">
                 <a:latin typeface="Microsoft YaHei Light" panose="020B0502040204020203" pitchFamily="34" charset="-122"/>
                 <a:ea typeface="Microsoft YaHei Light" panose="020B0502040204020203" pitchFamily="34" charset="-122"/>
               </a:rPr>
               <a:t>空闲</a:t>
             </a:r>
             <a:r>
-              <a:rPr lang="en-US" altLang="zh-CN" sz="2800" dirty="0" smtClean="0">
+              <a:rPr lang="en-US" altLang="zh-CN" sz="2800" dirty="0">
                 <a:latin typeface="Microsoft YaHei Light" panose="020B0502040204020203" pitchFamily="34" charset="-122"/>
                 <a:ea typeface="Microsoft YaHei Light" panose="020B0502040204020203" pitchFamily="34" charset="-122"/>
               </a:rPr>
@@ -4632,16 +4590,12 @@
             <a:p>
               <a:pPr algn="ctr"/>
               <a:r>
-                <a:rPr lang="en-US" sz="2400" dirty="0" smtClean="0">
+                <a:rPr lang="en-US" sz="2400" dirty="0">
                   <a:latin typeface="Microsoft YaHei Light" panose="020B0502040204020203" pitchFamily="34" charset="-122"/>
                   <a:ea typeface="Microsoft YaHei Light" panose="020B0502040204020203" pitchFamily="34" charset="-122"/>
                 </a:rPr>
                 <a:t>1</a:t>
               </a:r>
-              <a:endParaRPr lang="en-US" sz="2400" dirty="0">
-                <a:latin typeface="Microsoft YaHei Light" panose="020B0502040204020203" pitchFamily="34" charset="-122"/>
-                <a:ea typeface="Microsoft YaHei Light" panose="020B0502040204020203" pitchFamily="34" charset="-122"/>
-              </a:endParaRPr>
             </a:p>
           </p:txBody>
         </p:sp>
@@ -4717,7 +4671,7 @@
           <a:lstStyle/>
           <a:p>
             <a:r>
-              <a:rPr lang="zh-CN" altLang="en-US" sz="2800" dirty="0" smtClean="0">
+              <a:rPr lang="zh-CN" altLang="en-US" sz="2800" dirty="0">
                 <a:latin typeface="Microsoft YaHei Light" panose="020B0502040204020203" pitchFamily="34" charset="-122"/>
                 <a:ea typeface="Microsoft YaHei Light" panose="020B0502040204020203" pitchFamily="34" charset="-122"/>
               </a:rPr>
@@ -4740,13 +4694,6 @@
   <p:clrMapOvr>
     <a:masterClrMapping/>
   </p:clrMapOvr>
-  <p:timing>
-    <p:tnLst>
-      <p:par>
-        <p:cTn id="1" dur="indefinite" restart="never" nodeType="tmRoot"/>
-      </p:par>
-    </p:tnLst>
-  </p:timing>
 </p:sld>
 </file>
 
@@ -5186,7 +5133,7 @@
           <a:p>
             <a:pPr algn="ctr"/>
             <a:r>
-              <a:rPr lang="zh-CN" altLang="en-US" sz="4400" dirty="0" smtClean="0">
+              <a:rPr lang="zh-CN" altLang="en-US" sz="4400" dirty="0">
                 <a:solidFill>
                   <a:schemeClr val="bg1">
                     <a:lumMod val="95000"/>
@@ -5631,28 +5578,28 @@
           <a:p>
             <a:pPr algn="ctr"/>
             <a:r>
-              <a:rPr lang="en-US" altLang="zh-CN" sz="2400" smtClean="0">
+              <a:rPr lang="en-US" altLang="zh-CN" sz="2400">
                 <a:latin typeface="Microsoft YaHei Light" panose="020B0502040204020203" pitchFamily="34" charset="-122"/>
                 <a:ea typeface="Microsoft YaHei Light" panose="020B0502040204020203" pitchFamily="34" charset="-122"/>
               </a:rPr>
               <a:t>[</a:t>
             </a:r>
             <a:r>
-              <a:rPr lang="zh-CN" altLang="en-US" sz="2400" smtClean="0">
+              <a:rPr lang="zh-CN" altLang="en-US" sz="2400">
                 <a:latin typeface="Microsoft YaHei Light" panose="020B0502040204020203" pitchFamily="34" charset="-122"/>
                 <a:ea typeface="Microsoft YaHei Light" panose="020B0502040204020203" pitchFamily="34" charset="-122"/>
               </a:rPr>
               <a:t>房主</a:t>
             </a:r>
             <a:r>
-              <a:rPr lang="en-US" altLang="zh-CN" sz="2400" smtClean="0">
+              <a:rPr lang="en-US" altLang="zh-CN" sz="2400">
                 <a:latin typeface="Microsoft YaHei Light" panose="020B0502040204020203" pitchFamily="34" charset="-122"/>
                 <a:ea typeface="Microsoft YaHei Light" panose="020B0502040204020203" pitchFamily="34" charset="-122"/>
               </a:rPr>
               <a:t>]</a:t>
             </a:r>
             <a:r>
-              <a:rPr lang="zh-CN" altLang="en-US" sz="2400" smtClean="0">
+              <a:rPr lang="zh-CN" altLang="en-US" sz="2400">
                 <a:latin typeface="Microsoft YaHei Light" panose="020B0502040204020203" pitchFamily="34" charset="-122"/>
                 <a:ea typeface="Microsoft YaHei Light" panose="020B0502040204020203" pitchFamily="34" charset="-122"/>
               </a:rPr>
@@ -5688,7 +5635,7 @@
           <a:p>
             <a:pPr lvl="0" algn="ctr"/>
             <a:r>
-              <a:rPr lang="zh-CN" altLang="en-US" sz="2400" smtClean="0">
+              <a:rPr lang="zh-CN" altLang="en-US" sz="2400">
                 <a:solidFill>
                   <a:prstClr val="black"/>
                 </a:solidFill>
@@ -5730,7 +5677,7 @@
           <a:p>
             <a:pPr lvl="0" algn="ctr"/>
             <a:r>
-              <a:rPr lang="zh-CN" altLang="en-US" sz="2400" dirty="0" smtClean="0">
+              <a:rPr lang="zh-CN" altLang="en-US" sz="2400" dirty="0">
                 <a:solidFill>
                   <a:prstClr val="black"/>
                 </a:solidFill>
@@ -5874,16 +5821,12 @@
             <a:p>
               <a:pPr algn="ctr"/>
               <a:r>
-                <a:rPr lang="en-US" sz="2400" dirty="0" smtClean="0">
+                <a:rPr lang="en-US" sz="2400" dirty="0">
                   <a:latin typeface="Microsoft YaHei Light" panose="020B0502040204020203" pitchFamily="34" charset="-122"/>
                   <a:ea typeface="Microsoft YaHei Light" panose="020B0502040204020203" pitchFamily="34" charset="-122"/>
                 </a:rPr>
                 <a:t>6</a:t>
               </a:r>
-              <a:endParaRPr lang="en-US" sz="2400" dirty="0">
-                <a:latin typeface="Microsoft YaHei Light" panose="020B0502040204020203" pitchFamily="34" charset="-122"/>
-                <a:ea typeface="Microsoft YaHei Light" panose="020B0502040204020203" pitchFamily="34" charset="-122"/>
-              </a:endParaRPr>
             </a:p>
           </p:txBody>
         </p:sp>
@@ -6001,7 +5944,7 @@
           <a:p>
             <a:pPr lvl="0" algn="ctr"/>
             <a:r>
-              <a:rPr lang="zh-CN" altLang="en-US" sz="2400" dirty="0" smtClean="0">
+              <a:rPr lang="zh-CN" altLang="en-US" sz="2400" dirty="0">
                 <a:solidFill>
                   <a:prstClr val="black"/>
                 </a:solidFill>
@@ -6067,7 +6010,7 @@
           <a:p>
             <a:pPr algn="ctr"/>
             <a:r>
-              <a:rPr lang="zh-CN" altLang="en-US" sz="2000" dirty="0" smtClean="0">
+              <a:rPr lang="zh-CN" altLang="en-US" sz="2000" dirty="0">
                 <a:solidFill>
                   <a:schemeClr val="tx1"/>
                 </a:solidFill>
@@ -6096,13 +6039,6 @@
   <p:clrMapOvr>
     <a:masterClrMapping/>
   </p:clrMapOvr>
-  <p:timing>
-    <p:tnLst>
-      <p:par>
-        <p:cTn id="1" dur="indefinite" restart="never" nodeType="tmRoot"/>
-      </p:par>
-    </p:tnLst>
-  </p:timing>
 </p:sld>
 </file>
 
@@ -6166,7 +6102,7 @@
           <a:p>
             <a:pPr algn="ctr"/>
             <a:r>
-              <a:rPr lang="zh-CN" altLang="en-US" dirty="0" smtClean="0"/>
+              <a:rPr lang="zh-CN" altLang="en-US" dirty="0"/>
               <a:t>（渐黑过渡）</a:t>
             </a:r>
             <a:endParaRPr lang="en-US" dirty="0"/>
@@ -6183,13 +6119,6 @@
   <p:clrMapOvr>
     <a:masterClrMapping/>
   </p:clrMapOvr>
-  <p:timing>
-    <p:tnLst>
-      <p:par>
-        <p:cTn id="1" dur="indefinite" restart="never" nodeType="tmRoot"/>
-      </p:par>
-    </p:tnLst>
-  </p:timing>
 </p:sld>
 </file>
 
@@ -6752,7 +6681,13 @@
       </p:grpSp>
       <p:grpSp>
         <p:nvGrpSpPr>
-          <p:cNvPr id="2" name="Group 1"/>
+          <p:cNvPr id="4" name="组合 3">
+            <a:extLst>
+              <a:ext uri="{FF2B5EF4-FFF2-40B4-BE49-F238E27FC236}">
+                <a16:creationId xmlns:a16="http://schemas.microsoft.com/office/drawing/2014/main" id="{850A4BBF-7674-4575-B8DA-986C948D1CF1}"/>
+              </a:ext>
+            </a:extLst>
+          </p:cNvPr>
           <p:cNvGrpSpPr/>
           <p:nvPr/>
         </p:nvGrpSpPr>
@@ -7220,74 +7155,74 @@
             </a:prstGeom>
           </p:spPr>
         </p:pic>
-        <p:sp>
-          <p:nvSpPr>
-            <p:cNvPr id="9" name="Rectangle 8"/>
-            <p:cNvSpPr/>
-            <p:nvPr/>
-          </p:nvSpPr>
-          <p:spPr>
-            <a:xfrm>
-              <a:off x="12013976" y="3060812"/>
-              <a:ext cx="178024" cy="736375"/>
-            </a:xfrm>
-            <a:prstGeom prst="rect">
+      </p:grpSp>
+      <p:sp>
+        <p:nvSpPr>
+          <p:cNvPr id="9" name="Rectangle 8"/>
+          <p:cNvSpPr/>
+          <p:nvPr/>
+        </p:nvSpPr>
+        <p:spPr>
+          <a:xfrm>
+            <a:off x="12013976" y="3060812"/>
+            <a:ext cx="178024" cy="736375"/>
+          </a:xfrm>
+          <a:prstGeom prst="rect">
+            <a:avLst/>
+          </a:prstGeom>
+          <a:solidFill>
+            <a:schemeClr val="bg1">
+              <a:lumMod val="75000"/>
+            </a:schemeClr>
+          </a:solidFill>
+          <a:ln>
+            <a:solidFill>
+              <a:schemeClr val="tx1"/>
+            </a:solidFill>
+          </a:ln>
+        </p:spPr>
+        <p:style>
+          <a:lnRef idx="2">
+            <a:schemeClr val="accent1">
+              <a:shade val="50000"/>
+            </a:schemeClr>
+          </a:lnRef>
+          <a:fillRef idx="1">
+            <a:schemeClr val="accent1"/>
+          </a:fillRef>
+          <a:effectRef idx="0">
+            <a:schemeClr val="accent1"/>
+          </a:effectRef>
+          <a:fontRef idx="minor">
+            <a:schemeClr val="lt1"/>
+          </a:fontRef>
+        </p:style>
+        <p:txBody>
+          <a:bodyPr rot="0" spcFirstLastPara="0" vertOverflow="overflow" horzOverflow="overflow" vert="horz" wrap="square" lIns="91440" tIns="45720" rIns="91440" bIns="45720" numCol="1" spcCol="0" rtlCol="0" fromWordArt="0" anchor="ctr" anchorCtr="0" forceAA="0" compatLnSpc="1">
+            <a:prstTxWarp prst="textNoShape">
               <a:avLst/>
-            </a:prstGeom>
-            <a:solidFill>
-              <a:schemeClr val="bg1">
-                <a:lumMod val="75000"/>
-              </a:schemeClr>
-            </a:solidFill>
-            <a:ln>
-              <a:solidFill>
-                <a:schemeClr val="tx1"/>
-              </a:solidFill>
-            </a:ln>
-          </p:spPr>
-          <p:style>
-            <a:lnRef idx="2">
-              <a:schemeClr val="accent1">
-                <a:shade val="50000"/>
-              </a:schemeClr>
-            </a:lnRef>
-            <a:fillRef idx="1">
-              <a:schemeClr val="accent1"/>
-            </a:fillRef>
-            <a:effectRef idx="0">
-              <a:schemeClr val="accent1"/>
-            </a:effectRef>
-            <a:fontRef idx="minor">
-              <a:schemeClr val="lt1"/>
-            </a:fontRef>
-          </p:style>
-          <p:txBody>
-            <a:bodyPr rot="0" spcFirstLastPara="0" vertOverflow="overflow" horzOverflow="overflow" vert="horz" wrap="square" lIns="91440" tIns="45720" rIns="91440" bIns="45720" numCol="1" spcCol="0" rtlCol="0" fromWordArt="0" anchor="ctr" anchorCtr="0" forceAA="0" compatLnSpc="1">
-              <a:prstTxWarp prst="textNoShape">
-                <a:avLst/>
-              </a:prstTxWarp>
-              <a:noAutofit/>
-            </a:bodyPr>
-            <a:lstStyle/>
-            <a:p>
-              <a:pPr algn="ctr"/>
-              <a:r>
-                <a:rPr lang="zh-CN" altLang="en-US" sz="1200" dirty="0" smtClean="0">
-                  <a:solidFill>
-                    <a:sysClr val="windowText" lastClr="000000"/>
-                  </a:solidFill>
-                </a:rPr>
-                <a:t>◀</a:t>
-              </a:r>
-              <a:endParaRPr lang="en-US" sz="1200" dirty="0">
+            </a:prstTxWarp>
+            <a:noAutofit/>
+          </a:bodyPr>
+          <a:lstStyle/>
+          <a:p>
+            <a:pPr algn="ctr"/>
+            <a:r>
+              <a:rPr lang="zh-CN" altLang="en-US" sz="1200" dirty="0">
                 <a:solidFill>
                   <a:sysClr val="windowText" lastClr="000000"/>
                 </a:solidFill>
-              </a:endParaRPr>
-            </a:p>
-          </p:txBody>
-        </p:sp>
-      </p:grpSp>
+              </a:rPr>
+              <a:t>←</a:t>
+            </a:r>
+            <a:endParaRPr lang="en-US" sz="1200" dirty="0">
+              <a:solidFill>
+                <a:sysClr val="windowText" lastClr="000000"/>
+              </a:solidFill>
+            </a:endParaRPr>
+          </a:p>
+        </p:txBody>
+      </p:sp>
     </p:spTree>
     <p:extLst>
       <p:ext uri="{BB962C8B-B14F-4D97-AF65-F5344CB8AC3E}">
@@ -7298,13 +7233,6 @@
   <p:clrMapOvr>
     <a:masterClrMapping/>
   </p:clrMapOvr>
-  <p:timing>
-    <p:tnLst>
-      <p:par>
-        <p:cTn id="1" dur="indefinite" restart="never" nodeType="tmRoot"/>
-      </p:par>
-    </p:tnLst>
-  </p:timing>
 </p:sld>
 </file>
 
@@ -7873,7 +7801,7 @@
         </p:nvSpPr>
         <p:spPr>
           <a:xfrm>
-            <a:off x="9537812" y="0"/>
+            <a:off x="9574909" y="-48310"/>
             <a:ext cx="2654188" cy="6858000"/>
           </a:xfrm>
           <a:prstGeom prst="rect">
@@ -8450,12 +8378,12 @@
           <a:p>
             <a:pPr algn="ctr"/>
             <a:r>
-              <a:rPr lang="zh-CN" altLang="en-US" sz="1200" dirty="0" smtClean="0">
+              <a:rPr lang="zh-CN" altLang="en-US" sz="1200" dirty="0">
                 <a:solidFill>
                   <a:sysClr val="windowText" lastClr="000000"/>
                 </a:solidFill>
               </a:rPr>
-              <a:t>▶</a:t>
+              <a:t>→</a:t>
             </a:r>
             <a:endParaRPr lang="en-US" sz="1200" dirty="0">
               <a:solidFill>
@@ -8523,7 +8451,7 @@
           <a:lstStyle/>
           <a:p>
             <a:r>
-              <a:rPr lang="zh-CN" altLang="en-US" dirty="0" smtClean="0">
+              <a:rPr lang="zh-CN" altLang="en-US" dirty="0">
                 <a:latin typeface="Microsoft YaHei" panose="020B0503020204020204" pitchFamily="34" charset="-122"/>
                 <a:ea typeface="Microsoft YaHei" panose="020B0503020204020204" pitchFamily="34" charset="-122"/>
               </a:rPr>
@@ -8565,15 +8493,15 @@
               <a:buAutoNum type="arabicPeriod"/>
             </a:pPr>
             <a:r>
-              <a:rPr lang="en-US" sz="1400" dirty="0" smtClean="0"/>
+              <a:rPr lang="en-US" sz="1400" dirty="0"/>
               <a:t>Tom </a:t>
             </a:r>
             <a:r>
-              <a:rPr lang="zh-CN" altLang="en-US" sz="1400" dirty="0" smtClean="0"/>
+              <a:rPr lang="zh-CN" altLang="en-US" sz="1400" dirty="0"/>
               <a:t>需要</a:t>
             </a:r>
             <a:r>
-              <a:rPr lang="zh-CN" altLang="en-US" sz="1400" dirty="0" smtClean="0">
+              <a:rPr lang="zh-CN" altLang="en-US" sz="1400" dirty="0">
                 <a:solidFill>
                   <a:schemeClr val="accent1">
                     <a:lumMod val="75000"/>
@@ -8583,15 +8511,15 @@
               <a:t>驱散身上的恶灵 </a:t>
             </a:r>
             <a:r>
-              <a:rPr lang="en-US" altLang="zh-CN" sz="1400" dirty="0" smtClean="0"/>
+              <a:rPr lang="en-US" altLang="zh-CN" sz="1400" dirty="0"/>
               <a:t>[</a:t>
             </a:r>
             <a:r>
-              <a:rPr lang="zh-CN" altLang="en-US" sz="1400" dirty="0" smtClean="0"/>
+              <a:rPr lang="zh-CN" altLang="en-US" sz="1400" dirty="0"/>
               <a:t>难度</a:t>
             </a:r>
             <a:r>
-              <a:rPr lang="en-US" altLang="zh-CN" sz="1400" dirty="0" smtClean="0"/>
+              <a:rPr lang="en-US" altLang="zh-CN" sz="1400" dirty="0"/>
               <a:t>2]</a:t>
             </a:r>
           </a:p>
@@ -8603,19 +8531,15 @@
               <a:buAutoNum type="arabicPeriod"/>
             </a:pPr>
             <a:r>
-              <a:rPr lang="en-US" altLang="zh-CN" sz="1400" dirty="0" smtClean="0"/>
+              <a:rPr lang="en-US" altLang="zh-CN" sz="1400" dirty="0"/>
               <a:t>Lucy </a:t>
             </a:r>
             <a:r>
               <a:rPr lang="zh-CN" altLang="en-US" sz="1400" dirty="0"/>
-              <a:t>需</a:t>
-            </a:r>
-            <a:r>
-              <a:rPr lang="zh-CN" altLang="en-US" sz="1400" dirty="0" smtClean="0"/>
-              <a:t>要</a:t>
-            </a:r>
-            <a:r>
-              <a:rPr lang="en-US" altLang="zh-CN" sz="1400" dirty="0" smtClean="0">
+              <a:t>需要</a:t>
+            </a:r>
+            <a:r>
+              <a:rPr lang="en-US" altLang="zh-CN" sz="1400" dirty="0">
                 <a:solidFill>
                   <a:srgbClr val="FFC000"/>
                 </a:solidFill>
@@ -8623,7 +8547,7 @@
               <a:t>1</a:t>
             </a:r>
             <a:r>
-              <a:rPr lang="zh-CN" altLang="en-US" sz="1400" dirty="0" smtClean="0">
+              <a:rPr lang="zh-CN" altLang="en-US" sz="1400" dirty="0">
                 <a:solidFill>
                   <a:srgbClr val="FFC000"/>
                 </a:solidFill>
@@ -8631,7 +8555,7 @@
               <a:t>*铜钱剑</a:t>
             </a:r>
             <a:r>
-              <a:rPr lang="en-US" altLang="zh-CN" sz="1400" dirty="0" smtClean="0">
+              <a:rPr lang="en-US" altLang="zh-CN" sz="1400" dirty="0">
                 <a:solidFill>
                   <a:srgbClr val="FFC000"/>
                 </a:solidFill>
@@ -8639,22 +8563,18 @@
               <a:t> </a:t>
             </a:r>
             <a:r>
-              <a:rPr lang="en-US" altLang="zh-CN" sz="1400" dirty="0" smtClean="0"/>
+              <a:rPr lang="en-US" altLang="zh-CN" sz="1400" dirty="0"/>
               <a:t>[</a:t>
             </a:r>
             <a:r>
-              <a:rPr lang="zh-CN" altLang="en-US" sz="1400" dirty="0" smtClean="0"/>
+              <a:rPr lang="zh-CN" altLang="en-US" sz="1400" dirty="0"/>
               <a:t>难度</a:t>
             </a:r>
             <a:r>
               <a:rPr lang="en-US" altLang="zh-CN" sz="1400" dirty="0"/>
-              <a:t>1</a:t>
-            </a:r>
-            <a:r>
-              <a:rPr lang="en-US" altLang="zh-CN" sz="1400" dirty="0" smtClean="0"/>
-              <a:t>]</a:t>
-            </a:r>
-            <a:endParaRPr lang="zh-CN" altLang="en-US" sz="1400" dirty="0" smtClean="0">
+              <a:t>1]</a:t>
+            </a:r>
+            <a:endParaRPr lang="zh-CN" altLang="en-US" sz="1400" dirty="0">
               <a:solidFill>
                 <a:schemeClr val="accent4">
                   <a:lumMod val="75000"/>
@@ -8785,27 +8705,17 @@
                 <a:latin typeface="Microsoft YaHei" panose="020B0503020204020204" pitchFamily="34" charset="-122"/>
                 <a:ea typeface="Microsoft YaHei" panose="020B0503020204020204" pitchFamily="34" charset="-122"/>
               </a:rPr>
-              <a:t>系</a:t>
-            </a:r>
-            <a:r>
-              <a:rPr lang="zh-CN" altLang="en-US" sz="1100" dirty="0" smtClean="0">
-                <a:solidFill>
-                  <a:srgbClr val="C00000"/>
-                </a:solidFill>
-                <a:latin typeface="Microsoft YaHei" panose="020B0503020204020204" pitchFamily="34" charset="-122"/>
-                <a:ea typeface="Microsoft YaHei" panose="020B0503020204020204" pitchFamily="34" charset="-122"/>
-              </a:rPr>
-              <a:t>统</a:t>
-            </a:r>
-            <a:r>
-              <a:rPr lang="zh-CN" altLang="en-US" sz="1100" dirty="0" smtClean="0">
+              <a:t>系统</a:t>
+            </a:r>
+            <a:r>
+              <a:rPr lang="zh-CN" altLang="en-US" sz="1100" dirty="0">
                 <a:latin typeface="Microsoft YaHei" panose="020B0503020204020204" pitchFamily="34" charset="-122"/>
                 <a:ea typeface="Microsoft YaHei" panose="020B0503020204020204" pitchFamily="34" charset="-122"/>
               </a:rPr>
               <a:t>：</a:t>
             </a:r>
             <a:r>
-              <a:rPr lang="zh-CN" altLang="en-US" sz="1100" dirty="0" smtClean="0">
+              <a:rPr lang="zh-CN" altLang="en-US" sz="1100" dirty="0">
                 <a:solidFill>
                   <a:srgbClr val="7030A0"/>
                 </a:solidFill>
@@ -8815,7 +8725,7 @@
               <a:t>玩家</a:t>
             </a:r>
             <a:r>
-              <a:rPr lang="en-US" altLang="zh-CN" sz="1100" dirty="0" smtClean="0">
+              <a:rPr lang="en-US" altLang="zh-CN" sz="1100" dirty="0">
                 <a:solidFill>
                   <a:srgbClr val="7030A0"/>
                 </a:solidFill>
@@ -8825,7 +8735,7 @@
               <a:t>1 </a:t>
             </a:r>
             <a:r>
-              <a:rPr lang="zh-CN" altLang="en-US" sz="1100" dirty="0" smtClean="0">
+              <a:rPr lang="zh-CN" altLang="en-US" sz="1100" dirty="0">
                 <a:latin typeface="Microsoft YaHei" panose="020B0503020204020204" pitchFamily="34" charset="-122"/>
                 <a:ea typeface="Microsoft YaHei" panose="020B0503020204020204" pitchFamily="34" charset="-122"/>
               </a:rPr>
@@ -8839,20 +8749,10 @@
                 <a:latin typeface="Microsoft YaHei" panose="020B0503020204020204" pitchFamily="34" charset="-122"/>
                 <a:ea typeface="Microsoft YaHei" panose="020B0503020204020204" pitchFamily="34" charset="-122"/>
               </a:rPr>
-              <a:t>玩</a:t>
-            </a:r>
-            <a:r>
-              <a:rPr lang="zh-CN" altLang="en-US" sz="1100" dirty="0" smtClean="0">
-                <a:solidFill>
-                  <a:srgbClr val="7030A0"/>
-                </a:solidFill>
-                <a:latin typeface="Microsoft YaHei" panose="020B0503020204020204" pitchFamily="34" charset="-122"/>
-                <a:ea typeface="Microsoft YaHei" panose="020B0503020204020204" pitchFamily="34" charset="-122"/>
-              </a:rPr>
-              <a:t>家</a:t>
-            </a:r>
-            <a:r>
-              <a:rPr lang="en-US" altLang="zh-CN" sz="1100" dirty="0" smtClean="0">
+              <a:t>玩家</a:t>
+            </a:r>
+            <a:r>
+              <a:rPr lang="en-US" altLang="zh-CN" sz="1100" dirty="0">
                 <a:solidFill>
                   <a:srgbClr val="7030A0"/>
                 </a:solidFill>
@@ -8862,7 +8762,7 @@
               <a:t>1</a:t>
             </a:r>
             <a:r>
-              <a:rPr lang="zh-CN" altLang="en-US" sz="1100" dirty="0" smtClean="0">
+              <a:rPr lang="zh-CN" altLang="en-US" sz="1100" dirty="0">
                 <a:solidFill>
                   <a:srgbClr val="7030A0"/>
                 </a:solidFill>
@@ -8872,28 +8772,14 @@
               <a:t>的区域 </a:t>
             </a:r>
             <a:r>
-              <a:rPr lang="zh-CN" altLang="en-US" sz="1100" dirty="0" smtClean="0">
-                <a:latin typeface="Microsoft YaHei" panose="020B0503020204020204" pitchFamily="34" charset="-122"/>
-                <a:ea typeface="Microsoft YaHei" panose="020B0503020204020204" pitchFamily="34" charset="-122"/>
-              </a:rPr>
-              <a:t>放</a:t>
-            </a:r>
-            <a:r>
               <a:rPr lang="zh-CN" altLang="en-US" sz="1100" dirty="0">
                 <a:latin typeface="Microsoft YaHei" panose="020B0503020204020204" pitchFamily="34" charset="-122"/>
                 <a:ea typeface="Microsoft YaHei" panose="020B0503020204020204" pitchFamily="34" charset="-122"/>
               </a:rPr>
-              <a:t>置</a:t>
-            </a:r>
-            <a:r>
-              <a:rPr lang="zh-CN" altLang="en-US" sz="1100" dirty="0" smtClean="0">
-                <a:latin typeface="Microsoft YaHei" panose="020B0503020204020204" pitchFamily="34" charset="-122"/>
-                <a:ea typeface="Microsoft YaHei" panose="020B0503020204020204" pitchFamily="34" charset="-122"/>
-              </a:rPr>
-              <a:t>了</a:t>
-            </a:r>
-            <a:r>
-              <a:rPr lang="zh-CN" altLang="en-US" sz="1100" dirty="0" smtClean="0">
+              <a:t>放置了</a:t>
+            </a:r>
+            <a:r>
+              <a:rPr lang="zh-CN" altLang="en-US" sz="1100" dirty="0">
                 <a:solidFill>
                   <a:srgbClr val="FFC000"/>
                 </a:solidFill>
@@ -8902,7 +8788,7 @@
               </a:rPr>
               <a:t> 自杀宝典</a:t>
             </a:r>
-            <a:endParaRPr lang="en-US" altLang="zh-CN" sz="1100" dirty="0" smtClean="0">
+            <a:endParaRPr lang="en-US" altLang="zh-CN" sz="1100" dirty="0">
               <a:solidFill>
                 <a:srgbClr val="FFC000"/>
               </a:solidFill>
@@ -8917,7 +8803,7 @@
               </a:spcAft>
             </a:pPr>
             <a:r>
-              <a:rPr lang="zh-CN" altLang="en-US" sz="1100" dirty="0" smtClean="0">
+              <a:rPr lang="zh-CN" altLang="en-US" sz="1100" dirty="0">
                 <a:solidFill>
                   <a:schemeClr val="accent2">
                     <a:lumMod val="75000"/>
@@ -8929,7 +8815,7 @@
               <a:t>玩家</a:t>
             </a:r>
             <a:r>
-              <a:rPr lang="en-US" altLang="zh-CN" sz="1100" dirty="0" smtClean="0">
+              <a:rPr lang="en-US" altLang="zh-CN" sz="1100" dirty="0">
                 <a:solidFill>
                   <a:schemeClr val="accent2">
                     <a:lumMod val="75000"/>
@@ -8941,13 +8827,13 @@
               <a:t>2</a:t>
             </a:r>
             <a:r>
-              <a:rPr lang="zh-CN" altLang="en-US" sz="1100" dirty="0" smtClean="0">
+              <a:rPr lang="zh-CN" altLang="en-US" sz="1100" dirty="0">
                 <a:latin typeface="Microsoft YaHei" panose="020B0503020204020204" pitchFamily="34" charset="-122"/>
                 <a:ea typeface="Microsoft YaHei" panose="020B0503020204020204" pitchFamily="34" charset="-122"/>
               </a:rPr>
               <a:t>：哈哈哈还真放啊</a:t>
             </a:r>
-            <a:endParaRPr lang="en-US" altLang="zh-CN" sz="1100" dirty="0" smtClean="0">
+            <a:endParaRPr lang="en-US" altLang="zh-CN" sz="1100" dirty="0">
               <a:latin typeface="Microsoft YaHei" panose="020B0503020204020204" pitchFamily="34" charset="-122"/>
               <a:ea typeface="Microsoft YaHei" panose="020B0503020204020204" pitchFamily="34" charset="-122"/>
             </a:endParaRPr>
@@ -8966,20 +8852,10 @@
                 <a:latin typeface="Microsoft YaHei" panose="020B0503020204020204" pitchFamily="34" charset="-122"/>
                 <a:ea typeface="Microsoft YaHei" panose="020B0503020204020204" pitchFamily="34" charset="-122"/>
               </a:rPr>
-              <a:t>玩</a:t>
-            </a:r>
-            <a:r>
-              <a:rPr lang="zh-CN" altLang="en-US" sz="1100" dirty="0" smtClean="0">
-                <a:solidFill>
-                  <a:srgbClr val="7030A0"/>
-                </a:solidFill>
-                <a:latin typeface="Microsoft YaHei" panose="020B0503020204020204" pitchFamily="34" charset="-122"/>
-                <a:ea typeface="Microsoft YaHei" panose="020B0503020204020204" pitchFamily="34" charset="-122"/>
-              </a:rPr>
-              <a:t>家</a:t>
-            </a:r>
-            <a:r>
-              <a:rPr lang="en-US" altLang="zh-CN" sz="1100" dirty="0" smtClean="0">
+              <a:t>玩家</a:t>
+            </a:r>
+            <a:r>
+              <a:rPr lang="en-US" altLang="zh-CN" sz="1100" dirty="0">
                 <a:solidFill>
                   <a:srgbClr val="7030A0"/>
                 </a:solidFill>
@@ -8989,28 +8865,28 @@
               <a:t>1</a:t>
             </a:r>
             <a:r>
-              <a:rPr lang="zh-CN" altLang="en-US" sz="1100" dirty="0" smtClean="0">
+              <a:rPr lang="zh-CN" altLang="en-US" sz="1100" dirty="0">
                 <a:latin typeface="Microsoft YaHei" panose="020B0503020204020204" pitchFamily="34" charset="-122"/>
                 <a:ea typeface="Microsoft YaHei" panose="020B0503020204020204" pitchFamily="34" charset="-122"/>
               </a:rPr>
               <a:t>：</a:t>
             </a:r>
             <a:r>
-              <a:rPr lang="en-US" altLang="ja-JP" sz="1100" dirty="0" smtClean="0">
+              <a:rPr lang="en-US" altLang="ja-JP" sz="1100" dirty="0">
                 <a:latin typeface="Microsoft YaHei" panose="020B0503020204020204" pitchFamily="34" charset="-122"/>
                 <a:ea typeface="Microsoft YaHei" panose="020B0503020204020204" pitchFamily="34" charset="-122"/>
               </a:rPr>
               <a:t>¯\_(</a:t>
             </a:r>
             <a:r>
-              <a:rPr lang="ja-JP" altLang="en-US" sz="1100" dirty="0" smtClean="0">
+              <a:rPr lang="ja-JP" altLang="en-US" sz="1100" dirty="0">
                 <a:latin typeface="Microsoft YaHei" panose="020B0503020204020204" pitchFamily="34" charset="-122"/>
                 <a:ea typeface="Microsoft YaHei" panose="020B0503020204020204" pitchFamily="34" charset="-122"/>
               </a:rPr>
               <a:t>ツ</a:t>
             </a:r>
             <a:r>
-              <a:rPr lang="en-US" altLang="ja-JP" sz="1100" dirty="0" smtClean="0">
+              <a:rPr lang="en-US" altLang="ja-JP" sz="1100" dirty="0">
                 <a:latin typeface="Microsoft YaHei" panose="020B0503020204020204" pitchFamily="34" charset="-122"/>
                 <a:ea typeface="Microsoft YaHei" panose="020B0503020204020204" pitchFamily="34" charset="-122"/>
               </a:rPr>
@@ -9109,7 +8985,7 @@
             <a:p>
               <a:pPr algn="ctr"/>
               <a:r>
-                <a:rPr lang="en-US" altLang="zh-CN" sz="1600" dirty="0" smtClean="0">
+                <a:rPr lang="en-US" altLang="zh-CN" sz="1600" dirty="0">
                   <a:latin typeface="Microsoft YaHei Light" panose="020B0502040204020203" pitchFamily="34" charset="-122"/>
                   <a:ea typeface="Microsoft YaHei Light" panose="020B0502040204020203" pitchFamily="34" charset="-122"/>
                 </a:rPr>
@@ -9181,13 +9057,6 @@
   <p:clrMapOvr>
     <a:masterClrMapping/>
   </p:clrMapOvr>
-  <p:timing>
-    <p:tnLst>
-      <p:par>
-        <p:cTn id="1" dur="indefinite" restart="never" nodeType="tmRoot"/>
-      </p:par>
-    </p:tnLst>
-  </p:timing>
 </p:sld>
 </file>
 

</xml_diff>